<commit_message>
Version 2 with Architecture added
</commit_message>
<xml_diff>
--- a/Project Release Plan.pptx
+++ b/Project Release Plan.pptx
@@ -8454,6 +8454,102 @@
                 <a:cs typeface="Trebuchet MS"/>
                 <a:sym typeface="Trebuchet MS"/>
               </a:rPr>
+              <a:t>Have you wondered where your web requests go ?</a:t>
+            </a:r>
+            <a:endParaRPr b="1" sz="1500">
+              <a:solidFill>
+                <a:srgbClr val="404040"/>
+              </a:solidFill>
+              <a:latin typeface="Trebuchet MS"/>
+              <a:ea typeface="Trebuchet MS"/>
+              <a:cs typeface="Trebuchet MS"/>
+              <a:sym typeface="Trebuchet MS"/>
+            </a:endParaRPr>
+          </a:p>
+          <a:p>
+            <a:pPr indent="0" lvl="0" marL="0" rtl="0" algn="l">
+              <a:spcBef>
+                <a:spcPts val="1000"/>
+              </a:spcBef>
+              <a:spcAft>
+                <a:spcPts val="0"/>
+              </a:spcAft>
+              <a:buNone/>
+            </a:pPr>
+            <a:r>
+              <a:rPr b="1" lang="en" sz="1500">
+                <a:solidFill>
+                  <a:srgbClr val="404040"/>
+                </a:solidFill>
+                <a:latin typeface="Trebuchet MS"/>
+                <a:ea typeface="Trebuchet MS"/>
+                <a:cs typeface="Trebuchet MS"/>
+                <a:sym typeface="Trebuchet MS"/>
+              </a:rPr>
+              <a:t> Where are these mystical devices ?</a:t>
+            </a:r>
+            <a:endParaRPr b="1" sz="1500">
+              <a:solidFill>
+                <a:srgbClr val="404040"/>
+              </a:solidFill>
+              <a:latin typeface="Trebuchet MS"/>
+              <a:ea typeface="Trebuchet MS"/>
+              <a:cs typeface="Trebuchet MS"/>
+              <a:sym typeface="Trebuchet MS"/>
+            </a:endParaRPr>
+          </a:p>
+          <a:p>
+            <a:pPr indent="0" lvl="0" marL="0" rtl="0" algn="l">
+              <a:spcBef>
+                <a:spcPts val="1000"/>
+              </a:spcBef>
+              <a:spcAft>
+                <a:spcPts val="0"/>
+              </a:spcAft>
+              <a:buNone/>
+            </a:pPr>
+            <a:r>
+              <a:rPr b="1" lang="en" sz="1500">
+                <a:solidFill>
+                  <a:srgbClr val="404040"/>
+                </a:solidFill>
+                <a:latin typeface="Trebuchet MS"/>
+                <a:ea typeface="Trebuchet MS"/>
+                <a:cs typeface="Trebuchet MS"/>
+                <a:sym typeface="Trebuchet MS"/>
+              </a:rPr>
+              <a:t>Introducing TrafficDump!</a:t>
+            </a:r>
+            <a:endParaRPr b="1" sz="1500">
+              <a:solidFill>
+                <a:srgbClr val="404040"/>
+              </a:solidFill>
+              <a:latin typeface="Trebuchet MS"/>
+              <a:ea typeface="Trebuchet MS"/>
+              <a:cs typeface="Trebuchet MS"/>
+              <a:sym typeface="Trebuchet MS"/>
+            </a:endParaRPr>
+          </a:p>
+          <a:p>
+            <a:pPr indent="0" lvl="0" marL="0" rtl="0" algn="l">
+              <a:spcBef>
+                <a:spcPts val="1000"/>
+              </a:spcBef>
+              <a:spcAft>
+                <a:spcPts val="0"/>
+              </a:spcAft>
+              <a:buNone/>
+            </a:pPr>
+            <a:r>
+              <a:rPr b="1" lang="en" sz="1500">
+                <a:solidFill>
+                  <a:srgbClr val="404040"/>
+                </a:solidFill>
+                <a:latin typeface="Trebuchet MS"/>
+                <a:ea typeface="Trebuchet MS"/>
+                <a:cs typeface="Trebuchet MS"/>
+                <a:sym typeface="Trebuchet MS"/>
+              </a:rPr>
               <a:t>TrafficDump is a web application that a</a:t>
             </a:r>
             <a:r>
@@ -8478,7 +8574,7 @@
                 <a:cs typeface="Trebuchet MS"/>
                 <a:sym typeface="Trebuchet MS"/>
               </a:rPr>
-              <a:t> from network devices located around campus </a:t>
+              <a:t> from network devices located inside and outside of campus, </a:t>
             </a:r>
             <a:r>
               <a:rPr b="1" lang="en" sz="1500">
@@ -8502,7 +8598,7 @@
                 <a:cs typeface="Trebuchet MS"/>
                 <a:sym typeface="Trebuchet MS"/>
               </a:rPr>
-              <a:t> and represent it as a list of graphical interface </a:t>
+              <a:t> and represents it as a list of graphical interfaces. </a:t>
             </a:r>
             <a:endParaRPr sz="1500">
               <a:solidFill>
@@ -8546,7 +8642,7 @@
                 <a:cs typeface="Trebuchet MS"/>
                 <a:sym typeface="Trebuchet MS"/>
               </a:rPr>
-              <a:t>provide a location with the best network signal</a:t>
+              <a:t>provide a location with the best network performance</a:t>
             </a:r>
             <a:r>
               <a:rPr lang="en" sz="1500">
@@ -9727,6 +9823,34 @@
           </a:p>
         </p:txBody>
       </p:sp>
+      <p:pic>
+        <p:nvPicPr>
+          <p:cNvPr id="131" name="Google Shape;131;p20"/>
+          <p:cNvPicPr preferRelativeResize="0"/>
+          <p:nvPr/>
+        </p:nvPicPr>
+        <p:blipFill>
+          <a:blip r:embed="rId3">
+            <a:alphaModFix/>
+          </a:blip>
+          <a:stretch>
+            <a:fillRect/>
+          </a:stretch>
+        </p:blipFill>
+        <p:spPr>
+          <a:xfrm>
+            <a:off x="645350" y="912450"/>
+            <a:ext cx="7898250" cy="4134725"/>
+          </a:xfrm>
+          <a:prstGeom prst="rect">
+            <a:avLst/>
+          </a:prstGeom>
+          <a:noFill/>
+          <a:ln>
+            <a:noFill/>
+          </a:ln>
+        </p:spPr>
+      </p:pic>
     </p:spTree>
   </p:cSld>
   <p:clrMapOvr>

</xml_diff>